<commit_message>
Update diagram and label comparison script
</commit_message>
<xml_diff>
--- a/Data/diagram.pptx
+++ b/Data/diagram.pptx
@@ -261,7 +261,7 @@
           <a:p>
             <a:fld id="{C7A9FD77-BC61-4EBA-8343-7D70495101BE}" type="datetimeFigureOut">
               <a:rPr lang="en-US" smtClean="0"/>
-              <a:t>5/2/2022</a:t>
+              <a:t>5/3/2022</a:t>
             </a:fld>
             <a:endParaRPr lang="en-US"/>
           </a:p>
@@ -461,7 +461,7 @@
           <a:p>
             <a:fld id="{C7A9FD77-BC61-4EBA-8343-7D70495101BE}" type="datetimeFigureOut">
               <a:rPr lang="en-US" smtClean="0"/>
-              <a:t>5/2/2022</a:t>
+              <a:t>5/3/2022</a:t>
             </a:fld>
             <a:endParaRPr lang="en-US"/>
           </a:p>
@@ -671,7 +671,7 @@
           <a:p>
             <a:fld id="{C7A9FD77-BC61-4EBA-8343-7D70495101BE}" type="datetimeFigureOut">
               <a:rPr lang="en-US" smtClean="0"/>
-              <a:t>5/2/2022</a:t>
+              <a:t>5/3/2022</a:t>
             </a:fld>
             <a:endParaRPr lang="en-US"/>
           </a:p>
@@ -871,7 +871,7 @@
           <a:p>
             <a:fld id="{C7A9FD77-BC61-4EBA-8343-7D70495101BE}" type="datetimeFigureOut">
               <a:rPr lang="en-US" smtClean="0"/>
-              <a:t>5/2/2022</a:t>
+              <a:t>5/3/2022</a:t>
             </a:fld>
             <a:endParaRPr lang="en-US"/>
           </a:p>
@@ -1147,7 +1147,7 @@
           <a:p>
             <a:fld id="{C7A9FD77-BC61-4EBA-8343-7D70495101BE}" type="datetimeFigureOut">
               <a:rPr lang="en-US" smtClean="0"/>
-              <a:t>5/2/2022</a:t>
+              <a:t>5/3/2022</a:t>
             </a:fld>
             <a:endParaRPr lang="en-US"/>
           </a:p>
@@ -1415,7 +1415,7 @@
           <a:p>
             <a:fld id="{C7A9FD77-BC61-4EBA-8343-7D70495101BE}" type="datetimeFigureOut">
               <a:rPr lang="en-US" smtClean="0"/>
-              <a:t>5/2/2022</a:t>
+              <a:t>5/3/2022</a:t>
             </a:fld>
             <a:endParaRPr lang="en-US"/>
           </a:p>
@@ -1830,7 +1830,7 @@
           <a:p>
             <a:fld id="{C7A9FD77-BC61-4EBA-8343-7D70495101BE}" type="datetimeFigureOut">
               <a:rPr lang="en-US" smtClean="0"/>
-              <a:t>5/2/2022</a:t>
+              <a:t>5/3/2022</a:t>
             </a:fld>
             <a:endParaRPr lang="en-US"/>
           </a:p>
@@ -1972,7 +1972,7 @@
           <a:p>
             <a:fld id="{C7A9FD77-BC61-4EBA-8343-7D70495101BE}" type="datetimeFigureOut">
               <a:rPr lang="en-US" smtClean="0"/>
-              <a:t>5/2/2022</a:t>
+              <a:t>5/3/2022</a:t>
             </a:fld>
             <a:endParaRPr lang="en-US"/>
           </a:p>
@@ -2085,7 +2085,7 @@
           <a:p>
             <a:fld id="{C7A9FD77-BC61-4EBA-8343-7D70495101BE}" type="datetimeFigureOut">
               <a:rPr lang="en-US" smtClean="0"/>
-              <a:t>5/2/2022</a:t>
+              <a:t>5/3/2022</a:t>
             </a:fld>
             <a:endParaRPr lang="en-US"/>
           </a:p>
@@ -2398,7 +2398,7 @@
           <a:p>
             <a:fld id="{C7A9FD77-BC61-4EBA-8343-7D70495101BE}" type="datetimeFigureOut">
               <a:rPr lang="en-US" smtClean="0"/>
-              <a:t>5/2/2022</a:t>
+              <a:t>5/3/2022</a:t>
             </a:fld>
             <a:endParaRPr lang="en-US"/>
           </a:p>
@@ -2687,7 +2687,7 @@
           <a:p>
             <a:fld id="{C7A9FD77-BC61-4EBA-8343-7D70495101BE}" type="datetimeFigureOut">
               <a:rPr lang="en-US" smtClean="0"/>
-              <a:t>5/2/2022</a:t>
+              <a:t>5/3/2022</a:t>
             </a:fld>
             <a:endParaRPr lang="en-US"/>
           </a:p>
@@ -2930,7 +2930,7 @@
           <a:p>
             <a:fld id="{C7A9FD77-BC61-4EBA-8343-7D70495101BE}" type="datetimeFigureOut">
               <a:rPr lang="en-US" smtClean="0"/>
-              <a:t>5/2/2022</a:t>
+              <a:t>5/3/2022</a:t>
             </a:fld>
             <a:endParaRPr lang="en-US"/>
           </a:p>
@@ -3566,8 +3566,8 @@
         </p:nvCxnSpPr>
         <p:spPr>
           <a:xfrm flipV="1">
-            <a:off x="5669873" y="3667588"/>
-            <a:ext cx="2669926" cy="134272"/>
+            <a:off x="5716871" y="3676703"/>
+            <a:ext cx="2866501" cy="78822"/>
           </a:xfrm>
           <a:prstGeom prst="line">
             <a:avLst/>
@@ -3731,10 +3731,9 @@
           <a:lstStyle/>
           <a:p>
             <a:r>
-              <a:rPr lang="fr-BE" sz="1000" dirty="0" err="1"/>
-              <a:t>trachea</a:t>
-            </a:r>
-            <a:endParaRPr lang="en-US" sz="1000" dirty="0"/>
+              <a:rPr lang="fr-BE" sz="1000" dirty="0"/>
+              <a:t>pharynx</a:t>
+            </a:r>
           </a:p>
         </p:txBody>
       </p:sp>
@@ -4068,7 +4067,7 @@
                   <a:srgbClr val="FF0000"/>
                 </a:solidFill>
               </a:rPr>
-              <a:t>unqualified</a:t>
+              <a:t>unclassified</a:t>
             </a:r>
             <a:endParaRPr lang="en-US" sz="1200" b="1" dirty="0">
               <a:solidFill>
@@ -4133,7 +4132,7 @@
         <p:spPr>
           <a:xfrm>
             <a:off x="2075740" y="2509589"/>
-            <a:ext cx="1636432" cy="461665"/>
+            <a:ext cx="1636432" cy="276999"/>
           </a:xfrm>
           <a:prstGeom prst="rect">
             <a:avLst/>
@@ -4149,15 +4148,7 @@
             <a:pPr algn="ctr"/>
             <a:r>
               <a:rPr lang="fr-BE" sz="1200" b="1" dirty="0"/>
-              <a:t>2 -  </a:t>
-            </a:r>
-            <a:r>
-              <a:rPr lang="fr-BE" sz="1200" b="1" dirty="0" err="1"/>
-              <a:t>squamocolumnar</a:t>
-            </a:r>
-            <a:r>
-              <a:rPr lang="fr-BE" sz="1200" b="1" dirty="0"/>
-              <a:t> </a:t>
+              <a:t>2 - </a:t>
             </a:r>
             <a:r>
               <a:rPr lang="fr-BE" sz="1200" b="1" dirty="0" err="1"/>
@@ -4181,7 +4172,7 @@
         </p:nvSpPr>
         <p:spPr>
           <a:xfrm>
-            <a:off x="8339799" y="3529088"/>
+            <a:off x="8583372" y="3538203"/>
             <a:ext cx="1477724" cy="276999"/>
           </a:xfrm>
           <a:prstGeom prst="rect">
@@ -4197,19 +4188,7 @@
           <a:p>
             <a:r>
               <a:rPr lang="fr-BE" sz="1200" b="1" dirty="0"/>
-              <a:t>3 -  </a:t>
-            </a:r>
-            <a:r>
-              <a:rPr lang="fr-BE" sz="1200" b="1" dirty="0" err="1"/>
-              <a:t>great</a:t>
-            </a:r>
-            <a:r>
-              <a:rPr lang="fr-BE" sz="1200" b="1" dirty="0"/>
-              <a:t> </a:t>
-            </a:r>
-            <a:r>
-              <a:rPr lang="fr-BE" sz="1200" b="1" dirty="0" err="1"/>
-              <a:t>curvature</a:t>
+              <a:t>3 -  corpus</a:t>
             </a:r>
             <a:endParaRPr lang="en-US" sz="1200" b="1" dirty="0"/>
           </a:p>
@@ -4245,7 +4224,15 @@
           <a:p>
             <a:r>
               <a:rPr lang="fr-BE" sz="1200" b="1" dirty="0"/>
-              <a:t>4 – pylore/antrum</a:t>
+              <a:t>4 – </a:t>
+            </a:r>
+            <a:r>
+              <a:rPr lang="fr-BE" sz="1200" b="1" dirty="0" err="1"/>
+              <a:t>pylorus</a:t>
+            </a:r>
+            <a:r>
+              <a:rPr lang="fr-BE" sz="1200" b="1" dirty="0"/>
+              <a:t>/antrum</a:t>
             </a:r>
             <a:endParaRPr lang="en-US" sz="1200" b="1" dirty="0"/>
           </a:p>
@@ -4490,6 +4477,42 @@
           <a:p>
             <a:pPr algn="ctr"/>
             <a:endParaRPr lang="en-US"/>
+          </a:p>
+        </p:txBody>
+      </p:sp>
+      <p:sp>
+        <p:nvSpPr>
+          <p:cNvPr id="30" name="ZoneTexte 29">
+            <a:extLst>
+              <a:ext uri="{FF2B5EF4-FFF2-40B4-BE49-F238E27FC236}">
+                <a16:creationId xmlns:a16="http://schemas.microsoft.com/office/drawing/2014/main" id="{16F54E96-E715-4FFD-AEA0-D85CC4C29459}"/>
+              </a:ext>
+            </a:extLst>
+          </p:cNvPr>
+          <p:cNvSpPr txBox="1"/>
+          <p:nvPr/>
+        </p:nvSpPr>
+        <p:spPr>
+          <a:xfrm>
+            <a:off x="5345692" y="4145497"/>
+            <a:ext cx="288913" cy="276999"/>
+          </a:xfrm>
+          <a:prstGeom prst="rect">
+            <a:avLst/>
+          </a:prstGeom>
+          <a:noFill/>
+        </p:spPr>
+        <p:txBody>
+          <a:bodyPr wrap="square" rtlCol="0">
+            <a:spAutoFit/>
+          </a:bodyPr>
+          <a:lstStyle/>
+          <a:p>
+            <a:r>
+              <a:rPr lang="fr-BE" sz="1200" b="1" dirty="0"/>
+              <a:t>3</a:t>
+            </a:r>
+            <a:endParaRPr lang="en-US" sz="1200" b="1" dirty="0"/>
           </a:p>
         </p:txBody>
       </p:sp>

</xml_diff>